<commit_message>
Adding notes for TDD
</commit_message>
<xml_diff>
--- a/doc/CCHub.pptx
+++ b/doc/CCHub.pptx
@@ -927,6 +927,214 @@
     <p:extLst>
       <p:ext uri="{BB962C8B-B14F-4D97-AF65-F5344CB8AC3E}">
         <p14:creationId xmlns:p14="http://schemas.microsoft.com/office/powerpoint/2010/main" val="3961918029"/>
+      </p:ext>
+    </p:extLst>
+  </p:cSld>
+  <p:clrMapOvr>
+    <a:masterClrMapping/>
+  </p:clrMapOvr>
+</p:notes>
+</file>
+
+<file path=ppt/notesSlides/notesSlide2.xml><?xml version="1.0" encoding="utf-8"?>
+<p:notes xmlns:a="http://schemas.openxmlformats.org/drawingml/2006/main" xmlns:r="http://schemas.openxmlformats.org/officeDocument/2006/relationships" xmlns:p="http://schemas.openxmlformats.org/presentationml/2006/main">
+  <p:cSld>
+    <p:spTree>
+      <p:nvGrpSpPr>
+        <p:cNvPr id="1" name=""/>
+        <p:cNvGrpSpPr/>
+        <p:nvPr/>
+      </p:nvGrpSpPr>
+      <p:grpSpPr>
+        <a:xfrm>
+          <a:off x="0" y="0"/>
+          <a:ext cx="0" cy="0"/>
+          <a:chOff x="0" y="0"/>
+          <a:chExt cx="0" cy="0"/>
+        </a:xfrm>
+      </p:grpSpPr>
+      <p:sp>
+        <p:nvSpPr>
+          <p:cNvPr id="2" name="Slide Image Placeholder 1"/>
+          <p:cNvSpPr>
+            <a:spLocks noGrp="1" noRot="1" noChangeAspect="1"/>
+          </p:cNvSpPr>
+          <p:nvPr>
+            <p:ph type="sldImg"/>
+          </p:nvPr>
+        </p:nvSpPr>
+        <p:spPr/>
+      </p:sp>
+      <p:sp>
+        <p:nvSpPr>
+          <p:cNvPr id="3" name="Notes Placeholder 2"/>
+          <p:cNvSpPr>
+            <a:spLocks noGrp="1"/>
+          </p:cNvSpPr>
+          <p:nvPr>
+            <p:ph type="body" idx="1"/>
+          </p:nvPr>
+        </p:nvSpPr>
+        <p:spPr/>
+        <p:txBody>
+          <a:bodyPr/>
+          <a:lstStyle/>
+          <a:p>
+            <a:r>
+              <a:rPr lang="en-US" dirty="0" smtClean="0"/>
+              <a:t>it "calculates a 5% tax before validation" do</a:t>
+            </a:r>
+          </a:p>
+          <a:p>
+            <a:r>
+              <a:rPr lang="en-US" dirty="0" smtClean="0"/>
+              <a:t>    item = </a:t>
+            </a:r>
+            <a:r>
+              <a:rPr lang="en-US" dirty="0" err="1" smtClean="0"/>
+              <a:t>Item.new</a:t>
+            </a:r>
+            <a:r>
+              <a:rPr lang="en-US" dirty="0" smtClean="0"/>
+              <a:t>(:name =&gt; "Candy", :price =&gt; 20)</a:t>
+            </a:r>
+          </a:p>
+          <a:p>
+            <a:r>
+              <a:rPr lang="en-US" dirty="0" smtClean="0"/>
+              <a:t>    </a:t>
+            </a:r>
+            <a:r>
+              <a:rPr lang="en-US" dirty="0" err="1" smtClean="0"/>
+              <a:t>item.valid</a:t>
+            </a:r>
+            <a:r>
+              <a:rPr lang="en-US" dirty="0" smtClean="0"/>
+              <a:t>?</a:t>
+            </a:r>
+          </a:p>
+          <a:p>
+            <a:r>
+              <a:rPr lang="en-US" dirty="0" smtClean="0"/>
+              <a:t>    </a:t>
+            </a:r>
+            <a:r>
+              <a:rPr lang="en-US" dirty="0" err="1" smtClean="0"/>
+              <a:t>item.tax.should</a:t>
+            </a:r>
+            <a:r>
+              <a:rPr lang="en-US" dirty="0" smtClean="0"/>
+              <a:t> == 1.0</a:t>
+            </a:r>
+          </a:p>
+          <a:p>
+            <a:r>
+              <a:rPr lang="en-US" dirty="0" smtClean="0"/>
+              <a:t>  end</a:t>
+            </a:r>
+          </a:p>
+          <a:p>
+            <a:endParaRPr lang="en-US" dirty="0" smtClean="0"/>
+          </a:p>
+          <a:p>
+            <a:r>
+              <a:rPr lang="en-US" dirty="0" smtClean="0"/>
+              <a:t>  it "rejects items who's price is not numeric" do</a:t>
+            </a:r>
+          </a:p>
+          <a:p>
+            <a:r>
+              <a:rPr lang="en-US" dirty="0" smtClean="0"/>
+              <a:t>    item = </a:t>
+            </a:r>
+            <a:r>
+              <a:rPr lang="en-US" dirty="0" err="1" smtClean="0"/>
+              <a:t>Item.new</a:t>
+            </a:r>
+            <a:r>
+              <a:rPr lang="en-US" dirty="0" smtClean="0"/>
+              <a:t>(:name =&gt; "Candy", :price =&gt; "</a:t>
+            </a:r>
+            <a:r>
+              <a:rPr lang="en-US" dirty="0" err="1" smtClean="0"/>
+              <a:t>asdfasdf</a:t>
+            </a:r>
+            <a:r>
+              <a:rPr lang="en-US" dirty="0" smtClean="0"/>
+              <a:t>")</a:t>
+            </a:r>
+          </a:p>
+          <a:p>
+            <a:r>
+              <a:rPr lang="en-US" dirty="0" smtClean="0"/>
+              <a:t>    </a:t>
+            </a:r>
+            <a:r>
+              <a:rPr lang="en-US" dirty="0" err="1" smtClean="0"/>
+              <a:t>item.should_not</a:t>
+            </a:r>
+            <a:r>
+              <a:rPr lang="en-US" dirty="0" smtClean="0"/>
+              <a:t> </a:t>
+            </a:r>
+            <a:r>
+              <a:rPr lang="en-US" dirty="0" err="1" smtClean="0"/>
+              <a:t>be_valid</a:t>
+            </a:r>
+            <a:endParaRPr lang="en-US" dirty="0" smtClean="0"/>
+          </a:p>
+          <a:p>
+            <a:r>
+              <a:rPr lang="en-US" dirty="0" smtClean="0"/>
+              <a:t>  end</a:t>
+            </a:r>
+          </a:p>
+          <a:p>
+            <a:endParaRPr lang="en-US" dirty="0" smtClean="0"/>
+          </a:p>
+          <a:p>
+            <a:r>
+              <a:rPr lang="en-US" dirty="0" err="1" smtClean="0"/>
+              <a:t>validates_numericality_of</a:t>
+            </a:r>
+            <a:r>
+              <a:rPr lang="en-US" smtClean="0"/>
+              <a:t> :price</a:t>
+            </a:r>
+          </a:p>
+          <a:p>
+            <a:endParaRPr lang="en-US" dirty="0"/>
+          </a:p>
+        </p:txBody>
+      </p:sp>
+      <p:sp>
+        <p:nvSpPr>
+          <p:cNvPr id="4" name="Slide Number Placeholder 3"/>
+          <p:cNvSpPr>
+            <a:spLocks noGrp="1"/>
+          </p:cNvSpPr>
+          <p:nvPr>
+            <p:ph type="sldNum" sz="quarter" idx="10"/>
+          </p:nvPr>
+        </p:nvSpPr>
+        <p:spPr/>
+        <p:txBody>
+          <a:bodyPr/>
+          <a:lstStyle/>
+          <a:p>
+            <a:fld id="{A2F1A774-C867-DF4C-B472-E163AB6F8B87}" type="slidenum">
+              <a:rPr lang="en-US" smtClean="0"/>
+              <a:pPr/>
+              <a:t>11</a:t>
+            </a:fld>
+            <a:endParaRPr lang="en-US"/>
+          </a:p>
+        </p:txBody>
+      </p:sp>
+    </p:spTree>
+    <p:extLst>
+      <p:ext uri="{BB962C8B-B14F-4D97-AF65-F5344CB8AC3E}">
+        <p14:creationId xmlns:p14="http://schemas.microsoft.com/office/powerpoint/2010/main" val="335115779"/>
       </p:ext>
     </p:extLst>
   </p:cSld>

</xml_diff>

<commit_message>
Fixing a validation issue and adding links slide
</commit_message>
<xml_diff>
--- a/doc/CCHub.pptx
+++ b/doc/CCHub.pptx
@@ -5,10 +5,10 @@
     <p:sldMasterId id="2147483648" r:id="rId1"/>
   </p:sldMasterIdLst>
   <p:notesMasterIdLst>
-    <p:notesMasterId r:id="rId20"/>
+    <p:notesMasterId r:id="rId21"/>
   </p:notesMasterIdLst>
   <p:handoutMasterIdLst>
-    <p:handoutMasterId r:id="rId21"/>
+    <p:handoutMasterId r:id="rId22"/>
   </p:handoutMasterIdLst>
   <p:sldIdLst>
     <p:sldId id="257" r:id="rId2"/>
@@ -28,7 +28,8 @@
     <p:sldId id="272" r:id="rId16"/>
     <p:sldId id="274" r:id="rId17"/>
     <p:sldId id="273" r:id="rId18"/>
-    <p:sldId id="275" r:id="rId19"/>
+    <p:sldId id="276" r:id="rId19"/>
+    <p:sldId id="275" r:id="rId20"/>
   </p:sldIdLst>
   <p:sldSz cx="9144000" cy="5715000" type="screen16x10"/>
   <p:notesSz cx="6858000" cy="9144000"/>
@@ -5875,6 +5876,143 @@
 </file>
 
 <file path=ppt/slides/slide18.xml><?xml version="1.0" encoding="utf-8"?>
+<p:sld xmlns:a="http://schemas.openxmlformats.org/drawingml/2006/main" xmlns:r="http://schemas.openxmlformats.org/officeDocument/2006/relationships" xmlns:p="http://schemas.openxmlformats.org/presentationml/2006/main">
+  <p:cSld>
+    <p:spTree>
+      <p:nvGrpSpPr>
+        <p:cNvPr id="1" name=""/>
+        <p:cNvGrpSpPr/>
+        <p:nvPr/>
+      </p:nvGrpSpPr>
+      <p:grpSpPr>
+        <a:xfrm>
+          <a:off x="0" y="0"/>
+          <a:ext cx="0" cy="0"/>
+          <a:chOff x="0" y="0"/>
+          <a:chExt cx="0" cy="0"/>
+        </a:xfrm>
+      </p:grpSpPr>
+      <p:sp>
+        <p:nvSpPr>
+          <p:cNvPr id="2" name="Title 1"/>
+          <p:cNvSpPr>
+            <a:spLocks noGrp="1"/>
+          </p:cNvSpPr>
+          <p:nvPr>
+            <p:ph type="title"/>
+          </p:nvPr>
+        </p:nvSpPr>
+        <p:spPr/>
+        <p:txBody>
+          <a:bodyPr/>
+          <a:lstStyle/>
+          <a:p>
+            <a:r>
+              <a:rPr lang="en-US" dirty="0" smtClean="0"/>
+              <a:t>Some links and books that might be of interest</a:t>
+            </a:r>
+            <a:endParaRPr lang="en-US" dirty="0"/>
+          </a:p>
+        </p:txBody>
+      </p:sp>
+      <p:sp>
+        <p:nvSpPr>
+          <p:cNvPr id="3" name="Content Placeholder 2"/>
+          <p:cNvSpPr>
+            <a:spLocks noGrp="1"/>
+          </p:cNvSpPr>
+          <p:nvPr>
+            <p:ph idx="1"/>
+          </p:nvPr>
+        </p:nvSpPr>
+        <p:spPr/>
+        <p:txBody>
+          <a:bodyPr/>
+          <a:lstStyle/>
+          <a:p>
+            <a:r>
+              <a:rPr lang="en-US" sz="1800" dirty="0" smtClean="0"/>
+              <a:t>Ruby and Rails lessons</a:t>
+            </a:r>
+          </a:p>
+          <a:p>
+            <a:pPr lvl="1"/>
+            <a:r>
+              <a:rPr lang="en-US" sz="1800" dirty="0" err="1" smtClean="0"/>
+              <a:t>www.rubykoans.com</a:t>
+            </a:r>
+            <a:endParaRPr lang="en-US" sz="1800" dirty="0" smtClean="0"/>
+          </a:p>
+          <a:p>
+            <a:pPr lvl="1"/>
+            <a:r>
+              <a:rPr lang="en-US" sz="1800" dirty="0" err="1" smtClean="0"/>
+              <a:t>ruby.railstutorial.org</a:t>
+            </a:r>
+            <a:endParaRPr lang="en-US" sz="1800" dirty="0" smtClean="0"/>
+          </a:p>
+          <a:p>
+            <a:r>
+              <a:rPr lang="en-US" sz="1800" dirty="0" smtClean="0"/>
+              <a:t>Extreme Programming Explained by Kent Beck and Cynthia Andres</a:t>
+            </a:r>
+          </a:p>
+          <a:p>
+            <a:r>
+              <a:rPr lang="en-US" sz="1800" dirty="0" smtClean="0"/>
+              <a:t>Test Driven Development: By Example by Kent Beck</a:t>
+            </a:r>
+          </a:p>
+          <a:p>
+            <a:r>
+              <a:rPr lang="en-US" sz="1800" dirty="0" smtClean="0"/>
+              <a:t>Refactoring by Martin Fowler and others</a:t>
+            </a:r>
+          </a:p>
+          <a:p>
+            <a:r>
+              <a:rPr lang="en-US" sz="1800" dirty="0" smtClean="0"/>
+              <a:t>Continuous Integration by Paul M. Duvall</a:t>
+            </a:r>
+          </a:p>
+          <a:p>
+            <a:r>
+              <a:rPr lang="en-US" sz="1800" dirty="0" smtClean="0"/>
+              <a:t>Continuous Delivery by </a:t>
+            </a:r>
+            <a:r>
+              <a:rPr lang="en-US" sz="1800" dirty="0" err="1" smtClean="0"/>
+              <a:t>Jez</a:t>
+            </a:r>
+            <a:r>
+              <a:rPr lang="en-US" sz="1800" dirty="0" smtClean="0"/>
+              <a:t> Humble and Dave Farley</a:t>
+            </a:r>
+            <a:endParaRPr lang="en-US" sz="1800" dirty="0"/>
+          </a:p>
+        </p:txBody>
+      </p:sp>
+    </p:spTree>
+    <p:extLst>
+      <p:ext uri="{BB962C8B-B14F-4D97-AF65-F5344CB8AC3E}">
+        <p14:creationId xmlns:p14="http://schemas.microsoft.com/office/powerpoint/2010/main" val="3263624739"/>
+      </p:ext>
+    </p:extLst>
+  </p:cSld>
+  <p:clrMapOvr>
+    <a:masterClrMapping/>
+  </p:clrMapOvr>
+  <p:timing>
+    <p:tnLst>
+      <p:par>
+        <p:cTn xmlns:p14="http://schemas.microsoft.com/office/powerpoint/2010/main" id="1" dur="indefinite" restart="never" nodeType="tmRoot"/>
+      </p:par>
+    </p:tnLst>
+  </p:timing>
+</p:sld>
+</file>
+
+<file path=ppt/slides/slide19.xml><?xml version="1.0" encoding="utf-8"?>
 <p:sld xmlns:a="http://schemas.openxmlformats.org/drawingml/2006/main" xmlns:r="http://schemas.openxmlformats.org/officeDocument/2006/relationships" xmlns:p="http://schemas.openxmlformats.org/presentationml/2006/main">
   <p:cSld>
     <p:spTree>

</xml_diff>